<commit_message>
add content for step 2
</commit_message>
<xml_diff>
--- a/devResources/Screenshots - Chris.pptx
+++ b/devResources/Screenshots - Chris.pptx
@@ -15,6 +15,14 @@
     <p:sldId id="257" r:id="rId9"/>
     <p:sldId id="258" r:id="rId10"/>
     <p:sldId id="261" r:id="rId11"/>
+    <p:sldId id="266" r:id="rId12"/>
+    <p:sldId id="269" r:id="rId13"/>
+    <p:sldId id="270" r:id="rId14"/>
+    <p:sldId id="267" r:id="rId15"/>
+    <p:sldId id="268" r:id="rId16"/>
+    <p:sldId id="271" r:id="rId17"/>
+    <p:sldId id="272" r:id="rId18"/>
+    <p:sldId id="273" r:id="rId19"/>
   </p:sldIdLst>
   <p:sldSz cx="12192000" cy="6858000"/>
   <p:notesSz cx="6858000" cy="9144000"/>
@@ -135,7 +143,19 @@
             <p14:sldId id="256"/>
             <p14:sldId id="257"/>
             <p14:sldId id="258"/>
+          </p14:sldIdLst>
+        </p14:section>
+        <p14:section name="Excel" id="{E1C8650A-E0BC-4723-BF29-FB1FA01469B9}">
+          <p14:sldIdLst>
             <p14:sldId id="261"/>
+            <p14:sldId id="266"/>
+            <p14:sldId id="269"/>
+            <p14:sldId id="270"/>
+            <p14:sldId id="267"/>
+            <p14:sldId id="268"/>
+            <p14:sldId id="271"/>
+            <p14:sldId id="272"/>
+            <p14:sldId id="273"/>
           </p14:sldIdLst>
         </p14:section>
       </p14:sectionLst>
@@ -296,7 +316,7 @@
           <a:p>
             <a:fld id="{644541E4-0029-43ED-8B8E-039FB63FC34F}" type="datetimeFigureOut">
               <a:rPr lang="en-GB" smtClean="0"/>
-              <a:t>16/11/2018</a:t>
+              <a:t>21/11/2018</a:t>
             </a:fld>
             <a:endParaRPr lang="en-GB"/>
           </a:p>
@@ -496,7 +516,7 @@
           <a:p>
             <a:fld id="{644541E4-0029-43ED-8B8E-039FB63FC34F}" type="datetimeFigureOut">
               <a:rPr lang="en-GB" smtClean="0"/>
-              <a:t>16/11/2018</a:t>
+              <a:t>21/11/2018</a:t>
             </a:fld>
             <a:endParaRPr lang="en-GB"/>
           </a:p>
@@ -706,7 +726,7 @@
           <a:p>
             <a:fld id="{644541E4-0029-43ED-8B8E-039FB63FC34F}" type="datetimeFigureOut">
               <a:rPr lang="en-GB" smtClean="0"/>
-              <a:t>16/11/2018</a:t>
+              <a:t>21/11/2018</a:t>
             </a:fld>
             <a:endParaRPr lang="en-GB"/>
           </a:p>
@@ -906,7 +926,7 @@
           <a:p>
             <a:fld id="{644541E4-0029-43ED-8B8E-039FB63FC34F}" type="datetimeFigureOut">
               <a:rPr lang="en-GB" smtClean="0"/>
-              <a:t>16/11/2018</a:t>
+              <a:t>21/11/2018</a:t>
             </a:fld>
             <a:endParaRPr lang="en-GB"/>
           </a:p>
@@ -1182,7 +1202,7 @@
           <a:p>
             <a:fld id="{644541E4-0029-43ED-8B8E-039FB63FC34F}" type="datetimeFigureOut">
               <a:rPr lang="en-GB" smtClean="0"/>
-              <a:t>16/11/2018</a:t>
+              <a:t>21/11/2018</a:t>
             </a:fld>
             <a:endParaRPr lang="en-GB"/>
           </a:p>
@@ -1450,7 +1470,7 @@
           <a:p>
             <a:fld id="{644541E4-0029-43ED-8B8E-039FB63FC34F}" type="datetimeFigureOut">
               <a:rPr lang="en-GB" smtClean="0"/>
-              <a:t>16/11/2018</a:t>
+              <a:t>21/11/2018</a:t>
             </a:fld>
             <a:endParaRPr lang="en-GB"/>
           </a:p>
@@ -1865,7 +1885,7 @@
           <a:p>
             <a:fld id="{644541E4-0029-43ED-8B8E-039FB63FC34F}" type="datetimeFigureOut">
               <a:rPr lang="en-GB" smtClean="0"/>
-              <a:t>16/11/2018</a:t>
+              <a:t>21/11/2018</a:t>
             </a:fld>
             <a:endParaRPr lang="en-GB"/>
           </a:p>
@@ -2007,7 +2027,7 @@
           <a:p>
             <a:fld id="{644541E4-0029-43ED-8B8E-039FB63FC34F}" type="datetimeFigureOut">
               <a:rPr lang="en-GB" smtClean="0"/>
-              <a:t>16/11/2018</a:t>
+              <a:t>21/11/2018</a:t>
             </a:fld>
             <a:endParaRPr lang="en-GB"/>
           </a:p>
@@ -2120,7 +2140,7 @@
           <a:p>
             <a:fld id="{644541E4-0029-43ED-8B8E-039FB63FC34F}" type="datetimeFigureOut">
               <a:rPr lang="en-GB" smtClean="0"/>
-              <a:t>16/11/2018</a:t>
+              <a:t>21/11/2018</a:t>
             </a:fld>
             <a:endParaRPr lang="en-GB"/>
           </a:p>
@@ -2433,7 +2453,7 @@
           <a:p>
             <a:fld id="{644541E4-0029-43ED-8B8E-039FB63FC34F}" type="datetimeFigureOut">
               <a:rPr lang="en-GB" smtClean="0"/>
-              <a:t>16/11/2018</a:t>
+              <a:t>21/11/2018</a:t>
             </a:fld>
             <a:endParaRPr lang="en-GB"/>
           </a:p>
@@ -2722,7 +2742,7 @@
           <a:p>
             <a:fld id="{644541E4-0029-43ED-8B8E-039FB63FC34F}" type="datetimeFigureOut">
               <a:rPr lang="en-GB" smtClean="0"/>
-              <a:t>16/11/2018</a:t>
+              <a:t>21/11/2018</a:t>
             </a:fld>
             <a:endParaRPr lang="en-GB"/>
           </a:p>
@@ -2965,7 +2985,7 @@
           <a:p>
             <a:fld id="{644541E4-0029-43ED-8B8E-039FB63FC34F}" type="datetimeFigureOut">
               <a:rPr lang="en-GB" smtClean="0"/>
-              <a:t>16/11/2018</a:t>
+              <a:t>21/11/2018</a:t>
             </a:fld>
             <a:endParaRPr lang="en-GB"/>
           </a:p>
@@ -3693,10 +3713,2176 @@
           <a:chExt cx="0" cy="0"/>
         </a:xfrm>
       </p:grpSpPr>
+      <p:pic>
+        <p:nvPicPr>
+          <p:cNvPr id="2" name="Picture 1">
+            <a:extLst>
+              <a:ext uri="{FF2B5EF4-FFF2-40B4-BE49-F238E27FC236}">
+                <a16:creationId xmlns:a16="http://schemas.microsoft.com/office/drawing/2014/main" id="{A4556C87-AF5D-4734-B896-395EF47C3C1A}"/>
+              </a:ext>
+            </a:extLst>
+          </p:cNvPr>
+          <p:cNvPicPr>
+            <a:picLocks noChangeAspect="1"/>
+          </p:cNvPicPr>
+          <p:nvPr/>
+        </p:nvPicPr>
+        <p:blipFill rotWithShape="1">
+          <a:blip r:embed="rId2"/>
+          <a:srcRect b="72795"/>
+          <a:stretch/>
+        </p:blipFill>
+        <p:spPr>
+          <a:xfrm>
+            <a:off x="272473" y="157023"/>
+            <a:ext cx="8728364" cy="1865745"/>
+          </a:xfrm>
+          <a:prstGeom prst="rect">
+            <a:avLst/>
+          </a:prstGeom>
+        </p:spPr>
+      </p:pic>
+      <p:sp>
+        <p:nvSpPr>
+          <p:cNvPr id="3" name="TextBox 2">
+            <a:extLst>
+              <a:ext uri="{FF2B5EF4-FFF2-40B4-BE49-F238E27FC236}">
+                <a16:creationId xmlns:a16="http://schemas.microsoft.com/office/drawing/2014/main" id="{6E91C1D4-DDA0-4887-8591-C87AD01538EB}"/>
+              </a:ext>
+            </a:extLst>
+          </p:cNvPr>
+          <p:cNvSpPr txBox="1"/>
+          <p:nvPr/>
+        </p:nvSpPr>
+        <p:spPr>
+          <a:xfrm>
+            <a:off x="5236848" y="938701"/>
+            <a:ext cx="2142310" cy="903700"/>
+          </a:xfrm>
+          <a:prstGeom prst="rect">
+            <a:avLst/>
+          </a:prstGeom>
+          <a:solidFill>
+            <a:schemeClr val="tx1">
+              <a:alpha val="77000"/>
+            </a:schemeClr>
+          </a:solidFill>
+        </p:spPr>
+        <p:txBody>
+          <a:bodyPr wrap="square" lIns="36000" tIns="36000" rIns="36000" bIns="36000" rtlCol="0">
+            <a:spAutoFit/>
+          </a:bodyPr>
+          <a:lstStyle/>
+          <a:p>
+            <a:r>
+              <a:rPr lang="en-GB" dirty="0">
+                <a:solidFill>
+                  <a:schemeClr val="bg1"/>
+                </a:solidFill>
+              </a:rPr>
+              <a:t>You will see this button if MySQL for Excel is installed</a:t>
+            </a:r>
+            <a:endParaRPr lang="en-GB" dirty="0">
+              <a:solidFill>
+                <a:schemeClr val="accent4">
+                  <a:lumMod val="20000"/>
+                  <a:lumOff val="80000"/>
+                </a:schemeClr>
+              </a:solidFill>
+            </a:endParaRPr>
+          </a:p>
+        </p:txBody>
+      </p:sp>
+      <p:cxnSp>
+        <p:nvCxnSpPr>
+          <p:cNvPr id="4" name="Straight Arrow Connector 3">
+            <a:extLst>
+              <a:ext uri="{FF2B5EF4-FFF2-40B4-BE49-F238E27FC236}">
+                <a16:creationId xmlns:a16="http://schemas.microsoft.com/office/drawing/2014/main" id="{C72A88E0-D31D-4688-8738-28D4C9B61F70}"/>
+              </a:ext>
+            </a:extLst>
+          </p:cNvPr>
+          <p:cNvCxnSpPr>
+            <a:cxnSpLocks/>
+          </p:cNvCxnSpPr>
+          <p:nvPr/>
+        </p:nvCxnSpPr>
+        <p:spPr>
+          <a:xfrm flipV="1">
+            <a:off x="7475970" y="1314967"/>
+            <a:ext cx="369455" cy="120072"/>
+          </a:xfrm>
+          <a:prstGeom prst="straightConnector1">
+            <a:avLst/>
+          </a:prstGeom>
+          <a:ln w="38100">
+            <a:solidFill>
+              <a:srgbClr val="C00000"/>
+            </a:solidFill>
+            <a:tailEnd type="triangle"/>
+          </a:ln>
+        </p:spPr>
+        <p:style>
+          <a:lnRef idx="1">
+            <a:schemeClr val="accent1"/>
+          </a:lnRef>
+          <a:fillRef idx="0">
+            <a:schemeClr val="accent1"/>
+          </a:fillRef>
+          <a:effectRef idx="0">
+            <a:schemeClr val="accent1"/>
+          </a:effectRef>
+          <a:fontRef idx="minor">
+            <a:schemeClr val="tx1"/>
+          </a:fontRef>
+        </p:style>
+      </p:cxnSp>
+      <p:sp>
+        <p:nvSpPr>
+          <p:cNvPr id="5" name="Rectangle: Rounded Corners 4">
+            <a:extLst>
+              <a:ext uri="{FF2B5EF4-FFF2-40B4-BE49-F238E27FC236}">
+                <a16:creationId xmlns:a16="http://schemas.microsoft.com/office/drawing/2014/main" id="{9177F73F-2C1E-44D7-BE01-4313E81C5C0D}"/>
+              </a:ext>
+            </a:extLst>
+          </p:cNvPr>
+          <p:cNvSpPr/>
+          <p:nvPr/>
+        </p:nvSpPr>
+        <p:spPr>
+          <a:xfrm>
+            <a:off x="4155499" y="484656"/>
+            <a:ext cx="545809" cy="485167"/>
+          </a:xfrm>
+          <a:prstGeom prst="roundRect">
+            <a:avLst/>
+          </a:prstGeom>
+          <a:noFill/>
+          <a:ln w="57150">
+            <a:solidFill>
+              <a:srgbClr val="C00000"/>
+            </a:solidFill>
+          </a:ln>
+        </p:spPr>
+        <p:style>
+          <a:lnRef idx="2">
+            <a:schemeClr val="accent1">
+              <a:shade val="50000"/>
+            </a:schemeClr>
+          </a:lnRef>
+          <a:fillRef idx="1">
+            <a:schemeClr val="accent1"/>
+          </a:fillRef>
+          <a:effectRef idx="0">
+            <a:schemeClr val="accent1"/>
+          </a:effectRef>
+          <a:fontRef idx="minor">
+            <a:schemeClr val="lt1"/>
+          </a:fontRef>
+        </p:style>
+        <p:txBody>
+          <a:bodyPr rtlCol="0" anchor="ctr"/>
+          <a:lstStyle/>
+          <a:p>
+            <a:pPr algn="ctr"/>
+            <a:endParaRPr lang="en-GB" dirty="0"/>
+          </a:p>
+        </p:txBody>
+      </p:sp>
+      <p:sp>
+        <p:nvSpPr>
+          <p:cNvPr id="6" name="Multiplication Sign 5">
+            <a:extLst>
+              <a:ext uri="{FF2B5EF4-FFF2-40B4-BE49-F238E27FC236}">
+                <a16:creationId xmlns:a16="http://schemas.microsoft.com/office/drawing/2014/main" id="{E084AA8A-03E9-4FEB-BDB6-E11724322999}"/>
+              </a:ext>
+            </a:extLst>
+          </p:cNvPr>
+          <p:cNvSpPr/>
+          <p:nvPr/>
+        </p:nvSpPr>
+        <p:spPr>
+          <a:xfrm>
+            <a:off x="10592549" y="996909"/>
+            <a:ext cx="319086" cy="310393"/>
+          </a:xfrm>
+          <a:prstGeom prst="mathMultiply">
+            <a:avLst/>
+          </a:prstGeom>
+          <a:solidFill>
+            <a:srgbClr val="C00000"/>
+          </a:solidFill>
+          <a:ln>
+            <a:noFill/>
+          </a:ln>
+        </p:spPr>
+        <p:style>
+          <a:lnRef idx="2">
+            <a:schemeClr val="accent1">
+              <a:shade val="50000"/>
+            </a:schemeClr>
+          </a:lnRef>
+          <a:fillRef idx="1">
+            <a:schemeClr val="accent1"/>
+          </a:fillRef>
+          <a:effectRef idx="0">
+            <a:schemeClr val="accent1"/>
+          </a:effectRef>
+          <a:fontRef idx="minor">
+            <a:schemeClr val="lt1"/>
+          </a:fontRef>
+        </p:style>
+        <p:txBody>
+          <a:bodyPr rtlCol="0" anchor="ctr"/>
+          <a:lstStyle/>
+          <a:p>
+            <a:pPr algn="ctr"/>
+            <a:endParaRPr lang="en-GB"/>
+          </a:p>
+        </p:txBody>
+      </p:sp>
+      <p:pic>
+        <p:nvPicPr>
+          <p:cNvPr id="7" name="Picture 6">
+            <a:extLst>
+              <a:ext uri="{FF2B5EF4-FFF2-40B4-BE49-F238E27FC236}">
+                <a16:creationId xmlns:a16="http://schemas.microsoft.com/office/drawing/2014/main" id="{363F30A1-A3C7-436B-99B3-58FFDF28D2C6}"/>
+              </a:ext>
+            </a:extLst>
+          </p:cNvPr>
+          <p:cNvPicPr>
+            <a:picLocks noChangeAspect="1"/>
+          </p:cNvPicPr>
+          <p:nvPr/>
+        </p:nvPicPr>
+        <p:blipFill>
+          <a:blip r:embed="rId3">
+            <a:extLst>
+              <a:ext uri="{28A0092B-C50C-407E-A947-70E740481C1C}">
+                <a14:useLocalDpi xmlns:a14="http://schemas.microsoft.com/office/drawing/2010/main" val="0"/>
+              </a:ext>
+            </a:extLst>
+          </a:blip>
+          <a:stretch>
+            <a:fillRect/>
+          </a:stretch>
+        </p:blipFill>
+        <p:spPr>
+          <a:xfrm>
+            <a:off x="10082637" y="1293489"/>
+            <a:ext cx="371531" cy="278648"/>
+          </a:xfrm>
+          <a:prstGeom prst="rect">
+            <a:avLst/>
+          </a:prstGeom>
+        </p:spPr>
+      </p:pic>
+      <p:sp>
+        <p:nvSpPr>
+          <p:cNvPr id="12" name="Rectangle: Rounded Corners 11">
+            <a:extLst>
+              <a:ext uri="{FF2B5EF4-FFF2-40B4-BE49-F238E27FC236}">
+                <a16:creationId xmlns:a16="http://schemas.microsoft.com/office/drawing/2014/main" id="{CF4D4E02-9BE7-4B8F-886A-D31C72748488}"/>
+              </a:ext>
+            </a:extLst>
+          </p:cNvPr>
+          <p:cNvSpPr/>
+          <p:nvPr/>
+        </p:nvSpPr>
+        <p:spPr>
+          <a:xfrm>
+            <a:off x="7914699" y="847311"/>
+            <a:ext cx="832137" cy="935312"/>
+          </a:xfrm>
+          <a:prstGeom prst="roundRect">
+            <a:avLst/>
+          </a:prstGeom>
+          <a:noFill/>
+          <a:ln w="57150">
+            <a:solidFill>
+              <a:srgbClr val="C00000"/>
+            </a:solidFill>
+          </a:ln>
+        </p:spPr>
+        <p:style>
+          <a:lnRef idx="2">
+            <a:schemeClr val="accent1">
+              <a:shade val="50000"/>
+            </a:schemeClr>
+          </a:lnRef>
+          <a:fillRef idx="1">
+            <a:schemeClr val="accent1"/>
+          </a:fillRef>
+          <a:effectRef idx="0">
+            <a:schemeClr val="accent1"/>
+          </a:effectRef>
+          <a:fontRef idx="minor">
+            <a:schemeClr val="lt1"/>
+          </a:fontRef>
+        </p:style>
+        <p:txBody>
+          <a:bodyPr rtlCol="0" anchor="ctr"/>
+          <a:lstStyle/>
+          <a:p>
+            <a:pPr algn="ctr"/>
+            <a:endParaRPr lang="en-GB" dirty="0"/>
+          </a:p>
+        </p:txBody>
+      </p:sp>
+      <p:pic>
+        <p:nvPicPr>
+          <p:cNvPr id="8" name="Picture 7">
+            <a:extLst>
+              <a:ext uri="{FF2B5EF4-FFF2-40B4-BE49-F238E27FC236}">
+                <a16:creationId xmlns:a16="http://schemas.microsoft.com/office/drawing/2014/main" id="{D9FF60AA-1670-40A3-A317-3EF40A29E32A}"/>
+              </a:ext>
+            </a:extLst>
+          </p:cNvPr>
+          <p:cNvPicPr>
+            <a:picLocks noChangeAspect="1"/>
+          </p:cNvPicPr>
+          <p:nvPr/>
+        </p:nvPicPr>
+        <p:blipFill rotWithShape="1">
+          <a:blip r:embed="rId4"/>
+          <a:srcRect l="85746" t="28723" b="7694"/>
+          <a:stretch/>
+        </p:blipFill>
+        <p:spPr>
+          <a:xfrm>
+            <a:off x="364836" y="2432951"/>
+            <a:ext cx="1737832" cy="4194973"/>
+          </a:xfrm>
+          <a:prstGeom prst="rect">
+            <a:avLst/>
+          </a:prstGeom>
+        </p:spPr>
+      </p:pic>
+      <p:sp>
+        <p:nvSpPr>
+          <p:cNvPr id="10" name="Rectangle: Rounded Corners 9">
+            <a:extLst>
+              <a:ext uri="{FF2B5EF4-FFF2-40B4-BE49-F238E27FC236}">
+                <a16:creationId xmlns:a16="http://schemas.microsoft.com/office/drawing/2014/main" id="{752E0BD2-53D8-44E8-8D64-D409260703FD}"/>
+              </a:ext>
+            </a:extLst>
+          </p:cNvPr>
+          <p:cNvSpPr/>
+          <p:nvPr/>
+        </p:nvSpPr>
+        <p:spPr>
+          <a:xfrm>
+            <a:off x="353114" y="6005688"/>
+            <a:ext cx="1749554" cy="286843"/>
+          </a:xfrm>
+          <a:prstGeom prst="roundRect">
+            <a:avLst/>
+          </a:prstGeom>
+          <a:noFill/>
+          <a:ln w="57150">
+            <a:solidFill>
+              <a:srgbClr val="C00000"/>
+            </a:solidFill>
+          </a:ln>
+        </p:spPr>
+        <p:style>
+          <a:lnRef idx="2">
+            <a:schemeClr val="accent1">
+              <a:shade val="50000"/>
+            </a:schemeClr>
+          </a:lnRef>
+          <a:fillRef idx="1">
+            <a:schemeClr val="accent1"/>
+          </a:fillRef>
+          <a:effectRef idx="0">
+            <a:schemeClr val="accent1"/>
+          </a:effectRef>
+          <a:fontRef idx="minor">
+            <a:schemeClr val="lt1"/>
+          </a:fontRef>
+        </p:style>
+        <p:txBody>
+          <a:bodyPr rtlCol="0" anchor="ctr"/>
+          <a:lstStyle/>
+          <a:p>
+            <a:pPr algn="ctr"/>
+            <a:endParaRPr lang="en-GB" dirty="0"/>
+          </a:p>
+        </p:txBody>
+      </p:sp>
+      <p:pic>
+        <p:nvPicPr>
+          <p:cNvPr id="13" name="Picture 12">
+            <a:extLst>
+              <a:ext uri="{FF2B5EF4-FFF2-40B4-BE49-F238E27FC236}">
+                <a16:creationId xmlns:a16="http://schemas.microsoft.com/office/drawing/2014/main" id="{1A8C8B48-4C33-4634-B23D-63E31463F2C4}"/>
+              </a:ext>
+            </a:extLst>
+          </p:cNvPr>
+          <p:cNvPicPr>
+            <a:picLocks noChangeAspect="1"/>
+          </p:cNvPicPr>
+          <p:nvPr/>
+        </p:nvPicPr>
+        <p:blipFill>
+          <a:blip r:embed="rId5"/>
+          <a:stretch>
+            <a:fillRect/>
+          </a:stretch>
+        </p:blipFill>
+        <p:spPr>
+          <a:xfrm>
+            <a:off x="2657928" y="2442987"/>
+            <a:ext cx="6153564" cy="4266676"/>
+          </a:xfrm>
+          <a:prstGeom prst="rect">
+            <a:avLst/>
+          </a:prstGeom>
+        </p:spPr>
+      </p:pic>
+      <p:pic>
+        <p:nvPicPr>
+          <p:cNvPr id="14" name="Picture 13">
+            <a:extLst>
+              <a:ext uri="{FF2B5EF4-FFF2-40B4-BE49-F238E27FC236}">
+                <a16:creationId xmlns:a16="http://schemas.microsoft.com/office/drawing/2014/main" id="{EFBFCDE7-083C-4A6F-B49D-EFEDE1E10F78}"/>
+              </a:ext>
+            </a:extLst>
+          </p:cNvPr>
+          <p:cNvPicPr>
+            <a:picLocks noChangeAspect="1"/>
+          </p:cNvPicPr>
+          <p:nvPr/>
+        </p:nvPicPr>
+        <p:blipFill>
+          <a:blip r:embed="rId6"/>
+          <a:stretch>
+            <a:fillRect/>
+          </a:stretch>
+        </p:blipFill>
+        <p:spPr>
+          <a:xfrm>
+            <a:off x="9309409" y="2268043"/>
+            <a:ext cx="1602226" cy="4024488"/>
+          </a:xfrm>
+          <a:prstGeom prst="rect">
+            <a:avLst/>
+          </a:prstGeom>
+        </p:spPr>
+      </p:pic>
+      <p:sp>
+        <p:nvSpPr>
+          <p:cNvPr id="17" name="Rectangle: Rounded Corners 16">
+            <a:extLst>
+              <a:ext uri="{FF2B5EF4-FFF2-40B4-BE49-F238E27FC236}">
+                <a16:creationId xmlns:a16="http://schemas.microsoft.com/office/drawing/2014/main" id="{47949F4A-92A1-4AAC-AE1A-04B412420E29}"/>
+              </a:ext>
+            </a:extLst>
+          </p:cNvPr>
+          <p:cNvSpPr/>
+          <p:nvPr/>
+        </p:nvSpPr>
+        <p:spPr>
+          <a:xfrm>
+            <a:off x="9348280" y="4113315"/>
+            <a:ext cx="1544883" cy="375558"/>
+          </a:xfrm>
+          <a:prstGeom prst="roundRect">
+            <a:avLst/>
+          </a:prstGeom>
+          <a:noFill/>
+          <a:ln w="57150">
+            <a:solidFill>
+              <a:srgbClr val="C00000"/>
+            </a:solidFill>
+          </a:ln>
+        </p:spPr>
+        <p:style>
+          <a:lnRef idx="2">
+            <a:schemeClr val="accent1">
+              <a:shade val="50000"/>
+            </a:schemeClr>
+          </a:lnRef>
+          <a:fillRef idx="1">
+            <a:schemeClr val="accent1"/>
+          </a:fillRef>
+          <a:effectRef idx="0">
+            <a:schemeClr val="accent1"/>
+          </a:effectRef>
+          <a:fontRef idx="minor">
+            <a:schemeClr val="lt1"/>
+          </a:fontRef>
+        </p:style>
+        <p:txBody>
+          <a:bodyPr rtlCol="0" anchor="ctr"/>
+          <a:lstStyle/>
+          <a:p>
+            <a:pPr algn="ctr"/>
+            <a:endParaRPr lang="en-GB" dirty="0"/>
+          </a:p>
+        </p:txBody>
+      </p:sp>
     </p:spTree>
     <p:extLst>
       <p:ext uri="{BB962C8B-B14F-4D97-AF65-F5344CB8AC3E}">
         <p14:creationId xmlns:p14="http://schemas.microsoft.com/office/powerpoint/2010/main" val="3600058155"/>
+      </p:ext>
+    </p:extLst>
+  </p:cSld>
+  <p:clrMapOvr>
+    <a:masterClrMapping/>
+  </p:clrMapOvr>
+</p:sld>
+</file>
+
+<file path=ppt/slides/slide11.xml><?xml version="1.0" encoding="utf-8"?>
+<p:sld xmlns:a="http://schemas.openxmlformats.org/drawingml/2006/main" xmlns:r="http://schemas.openxmlformats.org/officeDocument/2006/relationships" xmlns:p="http://schemas.openxmlformats.org/presentationml/2006/main">
+  <p:cSld>
+    <p:spTree>
+      <p:nvGrpSpPr>
+        <p:cNvPr id="1" name=""/>
+        <p:cNvGrpSpPr/>
+        <p:nvPr/>
+      </p:nvGrpSpPr>
+      <p:grpSpPr>
+        <a:xfrm>
+          <a:off x="0" y="0"/>
+          <a:ext cx="0" cy="0"/>
+          <a:chOff x="0" y="0"/>
+          <a:chExt cx="0" cy="0"/>
+        </a:xfrm>
+      </p:grpSpPr>
+      <p:pic>
+        <p:nvPicPr>
+          <p:cNvPr id="2" name="Picture 1">
+            <a:extLst>
+              <a:ext uri="{FF2B5EF4-FFF2-40B4-BE49-F238E27FC236}">
+                <a16:creationId xmlns:a16="http://schemas.microsoft.com/office/drawing/2014/main" id="{698D7B96-4596-46AC-8A8B-89E0BB5254D4}"/>
+              </a:ext>
+            </a:extLst>
+          </p:cNvPr>
+          <p:cNvPicPr>
+            <a:picLocks noChangeAspect="1"/>
+          </p:cNvPicPr>
+          <p:nvPr/>
+        </p:nvPicPr>
+        <p:blipFill rotWithShape="1">
+          <a:blip r:embed="rId2"/>
+          <a:srcRect t="33984" b="5701"/>
+          <a:stretch/>
+        </p:blipFill>
+        <p:spPr>
+          <a:xfrm>
+            <a:off x="0" y="0"/>
+            <a:ext cx="2776466" cy="3429000"/>
+          </a:xfrm>
+          <a:prstGeom prst="rect">
+            <a:avLst/>
+          </a:prstGeom>
+        </p:spPr>
+      </p:pic>
+      <p:pic>
+        <p:nvPicPr>
+          <p:cNvPr id="4" name="Picture 3">
+            <a:extLst>
+              <a:ext uri="{FF2B5EF4-FFF2-40B4-BE49-F238E27FC236}">
+                <a16:creationId xmlns:a16="http://schemas.microsoft.com/office/drawing/2014/main" id="{2D6E5C5A-B3E3-49B4-B16A-1386BE08EBD8}"/>
+              </a:ext>
+            </a:extLst>
+          </p:cNvPr>
+          <p:cNvPicPr>
+            <a:picLocks noChangeAspect="1"/>
+          </p:cNvPicPr>
+          <p:nvPr/>
+        </p:nvPicPr>
+        <p:blipFill>
+          <a:blip r:embed="rId3"/>
+          <a:stretch>
+            <a:fillRect/>
+          </a:stretch>
+        </p:blipFill>
+        <p:spPr>
+          <a:xfrm>
+            <a:off x="2903743" y="0"/>
+            <a:ext cx="2534835" cy="3429000"/>
+          </a:xfrm>
+          <a:prstGeom prst="rect">
+            <a:avLst/>
+          </a:prstGeom>
+        </p:spPr>
+      </p:pic>
+      <p:pic>
+        <p:nvPicPr>
+          <p:cNvPr id="5" name="Picture 4">
+            <a:extLst>
+              <a:ext uri="{FF2B5EF4-FFF2-40B4-BE49-F238E27FC236}">
+                <a16:creationId xmlns:a16="http://schemas.microsoft.com/office/drawing/2014/main" id="{5E7A7E5C-A111-4B22-832E-05B48A942481}"/>
+              </a:ext>
+            </a:extLst>
+          </p:cNvPr>
+          <p:cNvPicPr>
+            <a:picLocks noChangeAspect="1"/>
+          </p:cNvPicPr>
+          <p:nvPr/>
+        </p:nvPicPr>
+        <p:blipFill>
+          <a:blip r:embed="rId4"/>
+          <a:stretch>
+            <a:fillRect/>
+          </a:stretch>
+        </p:blipFill>
+        <p:spPr>
+          <a:xfrm>
+            <a:off x="494131" y="3637935"/>
+            <a:ext cx="4564669" cy="2392464"/>
+          </a:xfrm>
+          <a:prstGeom prst="rect">
+            <a:avLst/>
+          </a:prstGeom>
+        </p:spPr>
+      </p:pic>
+      <p:pic>
+        <p:nvPicPr>
+          <p:cNvPr id="3" name="Picture 2">
+            <a:extLst>
+              <a:ext uri="{FF2B5EF4-FFF2-40B4-BE49-F238E27FC236}">
+                <a16:creationId xmlns:a16="http://schemas.microsoft.com/office/drawing/2014/main" id="{2EFAEC73-6623-476C-9D54-9B12445ACE14}"/>
+              </a:ext>
+            </a:extLst>
+          </p:cNvPr>
+          <p:cNvPicPr>
+            <a:picLocks noChangeAspect="1"/>
+          </p:cNvPicPr>
+          <p:nvPr/>
+        </p:nvPicPr>
+        <p:blipFill rotWithShape="1">
+          <a:blip r:embed="rId5"/>
+          <a:srcRect b="9391"/>
+          <a:stretch/>
+        </p:blipFill>
+        <p:spPr>
+          <a:xfrm>
+            <a:off x="5642531" y="0"/>
+            <a:ext cx="2713637" cy="3429000"/>
+          </a:xfrm>
+          <a:prstGeom prst="rect">
+            <a:avLst/>
+          </a:prstGeom>
+        </p:spPr>
+      </p:pic>
+      <p:sp>
+        <p:nvSpPr>
+          <p:cNvPr id="6" name="TextBox 5">
+            <a:extLst>
+              <a:ext uri="{FF2B5EF4-FFF2-40B4-BE49-F238E27FC236}">
+                <a16:creationId xmlns:a16="http://schemas.microsoft.com/office/drawing/2014/main" id="{BC3FB41C-F3E0-46E7-A32E-D14298738FF5}"/>
+              </a:ext>
+            </a:extLst>
+          </p:cNvPr>
+          <p:cNvSpPr txBox="1"/>
+          <p:nvPr/>
+        </p:nvSpPr>
+        <p:spPr>
+          <a:xfrm>
+            <a:off x="634155" y="5363105"/>
+            <a:ext cx="2142310" cy="626701"/>
+          </a:xfrm>
+          <a:prstGeom prst="rect">
+            <a:avLst/>
+          </a:prstGeom>
+          <a:solidFill>
+            <a:schemeClr val="tx1">
+              <a:alpha val="77000"/>
+            </a:schemeClr>
+          </a:solidFill>
+        </p:spPr>
+        <p:txBody>
+          <a:bodyPr wrap="square" lIns="36000" tIns="36000" rIns="36000" bIns="36000" rtlCol="0">
+            <a:spAutoFit/>
+          </a:bodyPr>
+          <a:lstStyle/>
+          <a:p>
+            <a:r>
+              <a:rPr lang="en-GB" dirty="0">
+                <a:solidFill>
+                  <a:schemeClr val="bg1"/>
+                </a:solidFill>
+              </a:rPr>
+              <a:t>Change this to utf8_Unicode_ci</a:t>
+            </a:r>
+            <a:endParaRPr lang="en-GB" dirty="0">
+              <a:solidFill>
+                <a:schemeClr val="accent4">
+                  <a:lumMod val="20000"/>
+                  <a:lumOff val="80000"/>
+                </a:schemeClr>
+              </a:solidFill>
+            </a:endParaRPr>
+          </a:p>
+        </p:txBody>
+      </p:sp>
+      <p:cxnSp>
+        <p:nvCxnSpPr>
+          <p:cNvPr id="7" name="Straight Arrow Connector 6">
+            <a:extLst>
+              <a:ext uri="{FF2B5EF4-FFF2-40B4-BE49-F238E27FC236}">
+                <a16:creationId xmlns:a16="http://schemas.microsoft.com/office/drawing/2014/main" id="{1C8ACF13-DB6B-4B16-92FC-B318318D30BC}"/>
+              </a:ext>
+            </a:extLst>
+          </p:cNvPr>
+          <p:cNvCxnSpPr>
+            <a:cxnSpLocks/>
+          </p:cNvCxnSpPr>
+          <p:nvPr/>
+        </p:nvCxnSpPr>
+        <p:spPr>
+          <a:xfrm flipH="1">
+            <a:off x="8353515" y="4442762"/>
+            <a:ext cx="343949" cy="294262"/>
+          </a:xfrm>
+          <a:prstGeom prst="straightConnector1">
+            <a:avLst/>
+          </a:prstGeom>
+          <a:ln w="38100">
+            <a:solidFill>
+              <a:srgbClr val="C00000"/>
+            </a:solidFill>
+            <a:tailEnd type="triangle"/>
+          </a:ln>
+        </p:spPr>
+        <p:style>
+          <a:lnRef idx="1">
+            <a:schemeClr val="accent1"/>
+          </a:lnRef>
+          <a:fillRef idx="0">
+            <a:schemeClr val="accent1"/>
+          </a:fillRef>
+          <a:effectRef idx="0">
+            <a:schemeClr val="accent1"/>
+          </a:effectRef>
+          <a:fontRef idx="minor">
+            <a:schemeClr val="tx1"/>
+          </a:fontRef>
+        </p:style>
+      </p:cxnSp>
+      <p:sp>
+        <p:nvSpPr>
+          <p:cNvPr id="8" name="Rectangle: Rounded Corners 7">
+            <a:extLst>
+              <a:ext uri="{FF2B5EF4-FFF2-40B4-BE49-F238E27FC236}">
+                <a16:creationId xmlns:a16="http://schemas.microsoft.com/office/drawing/2014/main" id="{B6FF3150-48CE-42A9-B080-F9132CD49EE2}"/>
+              </a:ext>
+            </a:extLst>
+          </p:cNvPr>
+          <p:cNvSpPr/>
+          <p:nvPr/>
+        </p:nvSpPr>
+        <p:spPr>
+          <a:xfrm>
+            <a:off x="7970118" y="4853451"/>
+            <a:ext cx="250970" cy="251023"/>
+          </a:xfrm>
+          <a:prstGeom prst="roundRect">
+            <a:avLst/>
+          </a:prstGeom>
+          <a:noFill/>
+          <a:ln w="57150">
+            <a:solidFill>
+              <a:srgbClr val="C00000"/>
+            </a:solidFill>
+          </a:ln>
+        </p:spPr>
+        <p:style>
+          <a:lnRef idx="2">
+            <a:schemeClr val="accent1">
+              <a:shade val="50000"/>
+            </a:schemeClr>
+          </a:lnRef>
+          <a:fillRef idx="1">
+            <a:schemeClr val="accent1"/>
+          </a:fillRef>
+          <a:effectRef idx="0">
+            <a:schemeClr val="accent1"/>
+          </a:effectRef>
+          <a:fontRef idx="minor">
+            <a:schemeClr val="lt1"/>
+          </a:fontRef>
+        </p:style>
+        <p:txBody>
+          <a:bodyPr rtlCol="0" anchor="ctr"/>
+          <a:lstStyle/>
+          <a:p>
+            <a:pPr algn="ctr"/>
+            <a:endParaRPr lang="en-GB" dirty="0"/>
+          </a:p>
+        </p:txBody>
+      </p:sp>
+      <p:sp>
+        <p:nvSpPr>
+          <p:cNvPr id="9" name="Rectangle: Rounded Corners 8">
+            <a:extLst>
+              <a:ext uri="{FF2B5EF4-FFF2-40B4-BE49-F238E27FC236}">
+                <a16:creationId xmlns:a16="http://schemas.microsoft.com/office/drawing/2014/main" id="{F503A318-4F47-4223-87AD-E34BEDE2BD53}"/>
+              </a:ext>
+            </a:extLst>
+          </p:cNvPr>
+          <p:cNvSpPr/>
+          <p:nvPr/>
+        </p:nvSpPr>
+        <p:spPr>
+          <a:xfrm>
+            <a:off x="2980418" y="2987706"/>
+            <a:ext cx="1942563" cy="441294"/>
+          </a:xfrm>
+          <a:prstGeom prst="roundRect">
+            <a:avLst/>
+          </a:prstGeom>
+          <a:noFill/>
+          <a:ln w="57150">
+            <a:solidFill>
+              <a:srgbClr val="C00000"/>
+            </a:solidFill>
+          </a:ln>
+        </p:spPr>
+        <p:style>
+          <a:lnRef idx="2">
+            <a:schemeClr val="accent1">
+              <a:shade val="50000"/>
+            </a:schemeClr>
+          </a:lnRef>
+          <a:fillRef idx="1">
+            <a:schemeClr val="accent1"/>
+          </a:fillRef>
+          <a:effectRef idx="0">
+            <a:schemeClr val="accent1"/>
+          </a:effectRef>
+          <a:fontRef idx="minor">
+            <a:schemeClr val="lt1"/>
+          </a:fontRef>
+        </p:style>
+        <p:txBody>
+          <a:bodyPr rtlCol="0" anchor="ctr"/>
+          <a:lstStyle/>
+          <a:p>
+            <a:pPr algn="ctr"/>
+            <a:endParaRPr lang="en-GB" dirty="0"/>
+          </a:p>
+        </p:txBody>
+      </p:sp>
+      <p:cxnSp>
+        <p:nvCxnSpPr>
+          <p:cNvPr id="10" name="Straight Arrow Connector 9">
+            <a:extLst>
+              <a:ext uri="{FF2B5EF4-FFF2-40B4-BE49-F238E27FC236}">
+                <a16:creationId xmlns:a16="http://schemas.microsoft.com/office/drawing/2014/main" id="{364A521A-6FB8-4A0C-B34F-A153F1B17461}"/>
+              </a:ext>
+            </a:extLst>
+          </p:cNvPr>
+          <p:cNvCxnSpPr>
+            <a:cxnSpLocks/>
+          </p:cNvCxnSpPr>
+          <p:nvPr/>
+        </p:nvCxnSpPr>
+        <p:spPr>
+          <a:xfrm flipV="1">
+            <a:off x="2139646" y="5322512"/>
+            <a:ext cx="450745" cy="294261"/>
+          </a:xfrm>
+          <a:prstGeom prst="straightConnector1">
+            <a:avLst/>
+          </a:prstGeom>
+          <a:ln w="38100">
+            <a:solidFill>
+              <a:srgbClr val="C00000"/>
+            </a:solidFill>
+            <a:tailEnd type="triangle"/>
+          </a:ln>
+        </p:spPr>
+        <p:style>
+          <a:lnRef idx="1">
+            <a:schemeClr val="accent1"/>
+          </a:lnRef>
+          <a:fillRef idx="0">
+            <a:schemeClr val="accent1"/>
+          </a:fillRef>
+          <a:effectRef idx="0">
+            <a:schemeClr val="accent1"/>
+          </a:effectRef>
+          <a:fontRef idx="minor">
+            <a:schemeClr val="tx1"/>
+          </a:fontRef>
+        </p:style>
+      </p:cxnSp>
+      <p:sp>
+        <p:nvSpPr>
+          <p:cNvPr id="15" name="Rectangle: Rounded Corners 14">
+            <a:extLst>
+              <a:ext uri="{FF2B5EF4-FFF2-40B4-BE49-F238E27FC236}">
+                <a16:creationId xmlns:a16="http://schemas.microsoft.com/office/drawing/2014/main" id="{4C198FD0-1FC5-48FD-BC9B-1797FCD0BD9A}"/>
+              </a:ext>
+            </a:extLst>
+          </p:cNvPr>
+          <p:cNvSpPr/>
+          <p:nvPr/>
+        </p:nvSpPr>
+        <p:spPr>
+          <a:xfrm>
+            <a:off x="5716444" y="835633"/>
+            <a:ext cx="2568573" cy="420512"/>
+          </a:xfrm>
+          <a:prstGeom prst="roundRect">
+            <a:avLst/>
+          </a:prstGeom>
+          <a:noFill/>
+          <a:ln w="57150">
+            <a:solidFill>
+              <a:srgbClr val="C00000"/>
+            </a:solidFill>
+          </a:ln>
+        </p:spPr>
+        <p:style>
+          <a:lnRef idx="2">
+            <a:schemeClr val="accent1">
+              <a:shade val="50000"/>
+            </a:schemeClr>
+          </a:lnRef>
+          <a:fillRef idx="1">
+            <a:schemeClr val="accent1"/>
+          </a:fillRef>
+          <a:effectRef idx="0">
+            <a:schemeClr val="accent1"/>
+          </a:effectRef>
+          <a:fontRef idx="minor">
+            <a:schemeClr val="lt1"/>
+          </a:fontRef>
+        </p:style>
+        <p:txBody>
+          <a:bodyPr rtlCol="0" anchor="ctr"/>
+          <a:lstStyle/>
+          <a:p>
+            <a:pPr algn="ctr"/>
+            <a:endParaRPr lang="en-GB" dirty="0"/>
+          </a:p>
+        </p:txBody>
+      </p:sp>
+    </p:spTree>
+    <p:extLst>
+      <p:ext uri="{BB962C8B-B14F-4D97-AF65-F5344CB8AC3E}">
+        <p14:creationId xmlns:p14="http://schemas.microsoft.com/office/powerpoint/2010/main" val="2003321952"/>
+      </p:ext>
+    </p:extLst>
+  </p:cSld>
+  <p:clrMapOvr>
+    <a:masterClrMapping/>
+  </p:clrMapOvr>
+</p:sld>
+</file>
+
+<file path=ppt/slides/slide12.xml><?xml version="1.0" encoding="utf-8"?>
+<p:sld xmlns:a="http://schemas.openxmlformats.org/drawingml/2006/main" xmlns:r="http://schemas.openxmlformats.org/officeDocument/2006/relationships" xmlns:p="http://schemas.openxmlformats.org/presentationml/2006/main">
+  <p:cSld>
+    <p:spTree>
+      <p:nvGrpSpPr>
+        <p:cNvPr id="1" name=""/>
+        <p:cNvGrpSpPr/>
+        <p:nvPr/>
+      </p:nvGrpSpPr>
+      <p:grpSpPr>
+        <a:xfrm>
+          <a:off x="0" y="0"/>
+          <a:ext cx="0" cy="0"/>
+          <a:chOff x="0" y="0"/>
+          <a:chExt cx="0" cy="0"/>
+        </a:xfrm>
+      </p:grpSpPr>
+      <p:pic>
+        <p:nvPicPr>
+          <p:cNvPr id="2" name="Picture 1">
+            <a:extLst>
+              <a:ext uri="{FF2B5EF4-FFF2-40B4-BE49-F238E27FC236}">
+                <a16:creationId xmlns:a16="http://schemas.microsoft.com/office/drawing/2014/main" id="{07CA4C9C-0CF4-4106-84AC-AAABA12B33F8}"/>
+              </a:ext>
+            </a:extLst>
+          </p:cNvPr>
+          <p:cNvPicPr>
+            <a:picLocks noChangeAspect="1"/>
+          </p:cNvPicPr>
+          <p:nvPr/>
+        </p:nvPicPr>
+        <p:blipFill>
+          <a:blip r:embed="rId2"/>
+          <a:stretch>
+            <a:fillRect/>
+          </a:stretch>
+        </p:blipFill>
+        <p:spPr>
+          <a:xfrm>
+            <a:off x="0" y="130175"/>
+            <a:ext cx="12192000" cy="6597650"/>
+          </a:xfrm>
+          <a:prstGeom prst="rect">
+            <a:avLst/>
+          </a:prstGeom>
+        </p:spPr>
+      </p:pic>
+      <p:sp>
+        <p:nvSpPr>
+          <p:cNvPr id="3" name="Rectangle: Rounded Corners 2">
+            <a:extLst>
+              <a:ext uri="{FF2B5EF4-FFF2-40B4-BE49-F238E27FC236}">
+                <a16:creationId xmlns:a16="http://schemas.microsoft.com/office/drawing/2014/main" id="{7ED3F4DE-C2FF-4897-9CD3-8AC84465ECD5}"/>
+              </a:ext>
+            </a:extLst>
+          </p:cNvPr>
+          <p:cNvSpPr/>
+          <p:nvPr/>
+        </p:nvSpPr>
+        <p:spPr>
+          <a:xfrm>
+            <a:off x="18472" y="1990178"/>
+            <a:ext cx="250970" cy="251023"/>
+          </a:xfrm>
+          <a:prstGeom prst="roundRect">
+            <a:avLst/>
+          </a:prstGeom>
+          <a:noFill/>
+          <a:ln w="57150">
+            <a:solidFill>
+              <a:srgbClr val="C00000"/>
+            </a:solidFill>
+          </a:ln>
+        </p:spPr>
+        <p:style>
+          <a:lnRef idx="2">
+            <a:schemeClr val="accent1">
+              <a:shade val="50000"/>
+            </a:schemeClr>
+          </a:lnRef>
+          <a:fillRef idx="1">
+            <a:schemeClr val="accent1"/>
+          </a:fillRef>
+          <a:effectRef idx="0">
+            <a:schemeClr val="accent1"/>
+          </a:effectRef>
+          <a:fontRef idx="minor">
+            <a:schemeClr val="lt1"/>
+          </a:fontRef>
+        </p:style>
+        <p:txBody>
+          <a:bodyPr rtlCol="0" anchor="ctr"/>
+          <a:lstStyle/>
+          <a:p>
+            <a:pPr algn="ctr"/>
+            <a:endParaRPr lang="en-GB" dirty="0"/>
+          </a:p>
+        </p:txBody>
+      </p:sp>
+      <p:sp>
+        <p:nvSpPr>
+          <p:cNvPr id="4" name="TextBox 3">
+            <a:extLst>
+              <a:ext uri="{FF2B5EF4-FFF2-40B4-BE49-F238E27FC236}">
+                <a16:creationId xmlns:a16="http://schemas.microsoft.com/office/drawing/2014/main" id="{3016D48C-5172-4D57-ABFE-1E2EA0D00EDE}"/>
+              </a:ext>
+            </a:extLst>
+          </p:cNvPr>
+          <p:cNvSpPr txBox="1"/>
+          <p:nvPr/>
+        </p:nvSpPr>
+        <p:spPr>
+          <a:xfrm>
+            <a:off x="504846" y="2462886"/>
+            <a:ext cx="2142310" cy="626701"/>
+          </a:xfrm>
+          <a:prstGeom prst="rect">
+            <a:avLst/>
+          </a:prstGeom>
+          <a:solidFill>
+            <a:schemeClr val="tx1">
+              <a:alpha val="77000"/>
+            </a:schemeClr>
+          </a:solidFill>
+        </p:spPr>
+        <p:txBody>
+          <a:bodyPr wrap="square" lIns="36000" tIns="36000" rIns="36000" bIns="36000" rtlCol="0">
+            <a:spAutoFit/>
+          </a:bodyPr>
+          <a:lstStyle/>
+          <a:p>
+            <a:r>
+              <a:rPr lang="en-GB" dirty="0">
+                <a:solidFill>
+                  <a:schemeClr val="bg1"/>
+                </a:solidFill>
+              </a:rPr>
+              <a:t>You can click here to select all data</a:t>
+            </a:r>
+            <a:endParaRPr lang="en-GB" dirty="0">
+              <a:solidFill>
+                <a:schemeClr val="accent4">
+                  <a:lumMod val="20000"/>
+                  <a:lumOff val="80000"/>
+                </a:schemeClr>
+              </a:solidFill>
+            </a:endParaRPr>
+          </a:p>
+        </p:txBody>
+      </p:sp>
+      <p:cxnSp>
+        <p:nvCxnSpPr>
+          <p:cNvPr id="5" name="Straight Arrow Connector 4">
+            <a:extLst>
+              <a:ext uri="{FF2B5EF4-FFF2-40B4-BE49-F238E27FC236}">
+                <a16:creationId xmlns:a16="http://schemas.microsoft.com/office/drawing/2014/main" id="{47FF21E1-8A49-44F6-B65E-DF5A28A872C3}"/>
+              </a:ext>
+            </a:extLst>
+          </p:cNvPr>
+          <p:cNvCxnSpPr>
+            <a:cxnSpLocks/>
+          </p:cNvCxnSpPr>
+          <p:nvPr/>
+        </p:nvCxnSpPr>
+        <p:spPr>
+          <a:xfrm flipH="1" flipV="1">
+            <a:off x="360219" y="2133601"/>
+            <a:ext cx="212436" cy="212435"/>
+          </a:xfrm>
+          <a:prstGeom prst="straightConnector1">
+            <a:avLst/>
+          </a:prstGeom>
+          <a:ln w="38100">
+            <a:solidFill>
+              <a:srgbClr val="C00000"/>
+            </a:solidFill>
+            <a:tailEnd type="triangle"/>
+          </a:ln>
+        </p:spPr>
+        <p:style>
+          <a:lnRef idx="1">
+            <a:schemeClr val="accent1"/>
+          </a:lnRef>
+          <a:fillRef idx="0">
+            <a:schemeClr val="accent1"/>
+          </a:fillRef>
+          <a:effectRef idx="0">
+            <a:schemeClr val="accent1"/>
+          </a:effectRef>
+          <a:fontRef idx="minor">
+            <a:schemeClr val="tx1"/>
+          </a:fontRef>
+        </p:style>
+      </p:cxnSp>
+      <p:sp>
+        <p:nvSpPr>
+          <p:cNvPr id="8" name="Rectangle: Rounded Corners 7">
+            <a:extLst>
+              <a:ext uri="{FF2B5EF4-FFF2-40B4-BE49-F238E27FC236}">
+                <a16:creationId xmlns:a16="http://schemas.microsoft.com/office/drawing/2014/main" id="{9E516663-0D28-4822-9C81-831B0886E9F2}"/>
+              </a:ext>
+            </a:extLst>
+          </p:cNvPr>
+          <p:cNvSpPr/>
+          <p:nvPr/>
+        </p:nvSpPr>
+        <p:spPr>
+          <a:xfrm>
+            <a:off x="10021454" y="2838564"/>
+            <a:ext cx="1865746" cy="384927"/>
+          </a:xfrm>
+          <a:prstGeom prst="roundRect">
+            <a:avLst/>
+          </a:prstGeom>
+          <a:noFill/>
+          <a:ln w="57150">
+            <a:solidFill>
+              <a:srgbClr val="C00000"/>
+            </a:solidFill>
+          </a:ln>
+        </p:spPr>
+        <p:style>
+          <a:lnRef idx="2">
+            <a:schemeClr val="accent1">
+              <a:shade val="50000"/>
+            </a:schemeClr>
+          </a:lnRef>
+          <a:fillRef idx="1">
+            <a:schemeClr val="accent1"/>
+          </a:fillRef>
+          <a:effectRef idx="0">
+            <a:schemeClr val="accent1"/>
+          </a:effectRef>
+          <a:fontRef idx="minor">
+            <a:schemeClr val="lt1"/>
+          </a:fontRef>
+        </p:style>
+        <p:txBody>
+          <a:bodyPr rtlCol="0" anchor="ctr"/>
+          <a:lstStyle/>
+          <a:p>
+            <a:pPr algn="ctr"/>
+            <a:endParaRPr lang="en-GB" dirty="0"/>
+          </a:p>
+        </p:txBody>
+      </p:sp>
+    </p:spTree>
+    <p:extLst>
+      <p:ext uri="{BB962C8B-B14F-4D97-AF65-F5344CB8AC3E}">
+        <p14:creationId xmlns:p14="http://schemas.microsoft.com/office/powerpoint/2010/main" val="1195573298"/>
+      </p:ext>
+    </p:extLst>
+  </p:cSld>
+  <p:clrMapOvr>
+    <a:masterClrMapping/>
+  </p:clrMapOvr>
+</p:sld>
+</file>
+
+<file path=ppt/slides/slide13.xml><?xml version="1.0" encoding="utf-8"?>
+<p:sld xmlns:a="http://schemas.openxmlformats.org/drawingml/2006/main" xmlns:r="http://schemas.openxmlformats.org/officeDocument/2006/relationships" xmlns:p="http://schemas.openxmlformats.org/presentationml/2006/main">
+  <p:cSld>
+    <p:spTree>
+      <p:nvGrpSpPr>
+        <p:cNvPr id="1" name=""/>
+        <p:cNvGrpSpPr/>
+        <p:nvPr/>
+      </p:nvGrpSpPr>
+      <p:grpSpPr>
+        <a:xfrm>
+          <a:off x="0" y="0"/>
+          <a:ext cx="0" cy="0"/>
+          <a:chOff x="0" y="0"/>
+          <a:chExt cx="0" cy="0"/>
+        </a:xfrm>
+      </p:grpSpPr>
+      <p:pic>
+        <p:nvPicPr>
+          <p:cNvPr id="2" name="Picture 1">
+            <a:extLst>
+              <a:ext uri="{FF2B5EF4-FFF2-40B4-BE49-F238E27FC236}">
+                <a16:creationId xmlns:a16="http://schemas.microsoft.com/office/drawing/2014/main" id="{6131D52F-27B4-4644-AFCA-EC133E1F3C37}"/>
+              </a:ext>
+            </a:extLst>
+          </p:cNvPr>
+          <p:cNvPicPr>
+            <a:picLocks noChangeAspect="1"/>
+          </p:cNvPicPr>
+          <p:nvPr/>
+        </p:nvPicPr>
+        <p:blipFill>
+          <a:blip r:embed="rId2"/>
+          <a:stretch>
+            <a:fillRect/>
+          </a:stretch>
+        </p:blipFill>
+        <p:spPr>
+          <a:xfrm>
+            <a:off x="1953960" y="0"/>
+            <a:ext cx="8284079" cy="6858000"/>
+          </a:xfrm>
+          <a:prstGeom prst="rect">
+            <a:avLst/>
+          </a:prstGeom>
+        </p:spPr>
+      </p:pic>
+      <p:pic>
+        <p:nvPicPr>
+          <p:cNvPr id="3" name="Picture 2">
+            <a:extLst>
+              <a:ext uri="{FF2B5EF4-FFF2-40B4-BE49-F238E27FC236}">
+                <a16:creationId xmlns:a16="http://schemas.microsoft.com/office/drawing/2014/main" id="{2991D791-C740-498B-BBA6-1031070C3178}"/>
+              </a:ext>
+            </a:extLst>
+          </p:cNvPr>
+          <p:cNvPicPr>
+            <a:picLocks noChangeAspect="1"/>
+          </p:cNvPicPr>
+          <p:nvPr/>
+        </p:nvPicPr>
+        <p:blipFill>
+          <a:blip r:embed="rId3"/>
+          <a:stretch>
+            <a:fillRect/>
+          </a:stretch>
+        </p:blipFill>
+        <p:spPr>
+          <a:xfrm>
+            <a:off x="5831609" y="2771199"/>
+            <a:ext cx="5372100" cy="1971675"/>
+          </a:xfrm>
+          <a:prstGeom prst="rect">
+            <a:avLst/>
+          </a:prstGeom>
+        </p:spPr>
+      </p:pic>
+      <p:sp>
+        <p:nvSpPr>
+          <p:cNvPr id="5" name="Rectangle: Rounded Corners 4">
+            <a:extLst>
+              <a:ext uri="{FF2B5EF4-FFF2-40B4-BE49-F238E27FC236}">
+                <a16:creationId xmlns:a16="http://schemas.microsoft.com/office/drawing/2014/main" id="{EA3662A8-68B2-4226-83B0-E72C6372BAD5}"/>
+              </a:ext>
+            </a:extLst>
+          </p:cNvPr>
+          <p:cNvSpPr/>
+          <p:nvPr/>
+        </p:nvSpPr>
+        <p:spPr>
+          <a:xfrm>
+            <a:off x="6522748" y="1781121"/>
+            <a:ext cx="2990706" cy="334006"/>
+          </a:xfrm>
+          <a:prstGeom prst="roundRect">
+            <a:avLst/>
+          </a:prstGeom>
+          <a:noFill/>
+          <a:ln w="57150">
+            <a:solidFill>
+              <a:srgbClr val="C00000"/>
+            </a:solidFill>
+          </a:ln>
+        </p:spPr>
+        <p:style>
+          <a:lnRef idx="2">
+            <a:schemeClr val="accent1">
+              <a:shade val="50000"/>
+            </a:schemeClr>
+          </a:lnRef>
+          <a:fillRef idx="1">
+            <a:schemeClr val="accent1"/>
+          </a:fillRef>
+          <a:effectRef idx="0">
+            <a:schemeClr val="accent1"/>
+          </a:effectRef>
+          <a:fontRef idx="minor">
+            <a:schemeClr val="lt1"/>
+          </a:fontRef>
+        </p:style>
+        <p:txBody>
+          <a:bodyPr rtlCol="0" anchor="ctr"/>
+          <a:lstStyle/>
+          <a:p>
+            <a:pPr algn="ctr"/>
+            <a:endParaRPr lang="en-GB" dirty="0"/>
+          </a:p>
+        </p:txBody>
+      </p:sp>
+    </p:spTree>
+    <p:extLst>
+      <p:ext uri="{BB962C8B-B14F-4D97-AF65-F5344CB8AC3E}">
+        <p14:creationId xmlns:p14="http://schemas.microsoft.com/office/powerpoint/2010/main" val="948588424"/>
+      </p:ext>
+    </p:extLst>
+  </p:cSld>
+  <p:clrMapOvr>
+    <a:masterClrMapping/>
+  </p:clrMapOvr>
+</p:sld>
+</file>
+
+<file path=ppt/slides/slide14.xml><?xml version="1.0" encoding="utf-8"?>
+<p:sld xmlns:a="http://schemas.openxmlformats.org/drawingml/2006/main" xmlns:r="http://schemas.openxmlformats.org/officeDocument/2006/relationships" xmlns:p="http://schemas.openxmlformats.org/presentationml/2006/main">
+  <p:cSld>
+    <p:spTree>
+      <p:nvGrpSpPr>
+        <p:cNvPr id="1" name=""/>
+        <p:cNvGrpSpPr/>
+        <p:nvPr/>
+      </p:nvGrpSpPr>
+      <p:grpSpPr>
+        <a:xfrm>
+          <a:off x="0" y="0"/>
+          <a:ext cx="0" cy="0"/>
+          <a:chOff x="0" y="0"/>
+          <a:chExt cx="0" cy="0"/>
+        </a:xfrm>
+      </p:grpSpPr>
+      <p:pic>
+        <p:nvPicPr>
+          <p:cNvPr id="2" name="Picture 1">
+            <a:extLst>
+              <a:ext uri="{FF2B5EF4-FFF2-40B4-BE49-F238E27FC236}">
+                <a16:creationId xmlns:a16="http://schemas.microsoft.com/office/drawing/2014/main" id="{2313B1F6-0C57-4047-9155-E972EB800AAD}"/>
+              </a:ext>
+            </a:extLst>
+          </p:cNvPr>
+          <p:cNvPicPr>
+            <a:picLocks noChangeAspect="1"/>
+          </p:cNvPicPr>
+          <p:nvPr/>
+        </p:nvPicPr>
+        <p:blipFill>
+          <a:blip r:embed="rId2"/>
+          <a:stretch>
+            <a:fillRect/>
+          </a:stretch>
+        </p:blipFill>
+        <p:spPr>
+          <a:xfrm>
+            <a:off x="0" y="130175"/>
+            <a:ext cx="12192000" cy="6597650"/>
+          </a:xfrm>
+          <a:prstGeom prst="rect">
+            <a:avLst/>
+          </a:prstGeom>
+        </p:spPr>
+      </p:pic>
+      <p:sp>
+        <p:nvSpPr>
+          <p:cNvPr id="3" name="Rectangle: Rounded Corners 2">
+            <a:extLst>
+              <a:ext uri="{FF2B5EF4-FFF2-40B4-BE49-F238E27FC236}">
+                <a16:creationId xmlns:a16="http://schemas.microsoft.com/office/drawing/2014/main" id="{635DF909-322B-48CD-9F19-15B96267AD04}"/>
+              </a:ext>
+            </a:extLst>
+          </p:cNvPr>
+          <p:cNvSpPr/>
+          <p:nvPr/>
+        </p:nvSpPr>
+        <p:spPr>
+          <a:xfrm>
+            <a:off x="1154544" y="6243782"/>
+            <a:ext cx="720438" cy="277091"/>
+          </a:xfrm>
+          <a:prstGeom prst="roundRect">
+            <a:avLst/>
+          </a:prstGeom>
+          <a:noFill/>
+          <a:ln w="57150">
+            <a:solidFill>
+              <a:srgbClr val="C00000"/>
+            </a:solidFill>
+          </a:ln>
+        </p:spPr>
+        <p:style>
+          <a:lnRef idx="2">
+            <a:schemeClr val="accent1">
+              <a:shade val="50000"/>
+            </a:schemeClr>
+          </a:lnRef>
+          <a:fillRef idx="1">
+            <a:schemeClr val="accent1"/>
+          </a:fillRef>
+          <a:effectRef idx="0">
+            <a:schemeClr val="accent1"/>
+          </a:effectRef>
+          <a:fontRef idx="minor">
+            <a:schemeClr val="lt1"/>
+          </a:fontRef>
+        </p:style>
+        <p:txBody>
+          <a:bodyPr rtlCol="0" anchor="ctr"/>
+          <a:lstStyle/>
+          <a:p>
+            <a:pPr algn="ctr"/>
+            <a:endParaRPr lang="en-GB" dirty="0"/>
+          </a:p>
+        </p:txBody>
+      </p:sp>
+      <p:sp>
+        <p:nvSpPr>
+          <p:cNvPr id="4" name="Rectangle: Rounded Corners 3">
+            <a:extLst>
+              <a:ext uri="{FF2B5EF4-FFF2-40B4-BE49-F238E27FC236}">
+                <a16:creationId xmlns:a16="http://schemas.microsoft.com/office/drawing/2014/main" id="{7FB071F6-7E22-44E5-9C7F-12186BDE55C2}"/>
+              </a:ext>
+            </a:extLst>
+          </p:cNvPr>
+          <p:cNvSpPr/>
+          <p:nvPr/>
+        </p:nvSpPr>
+        <p:spPr>
+          <a:xfrm>
+            <a:off x="10049164" y="2826327"/>
+            <a:ext cx="1856509" cy="387928"/>
+          </a:xfrm>
+          <a:prstGeom prst="roundRect">
+            <a:avLst/>
+          </a:prstGeom>
+          <a:noFill/>
+          <a:ln w="57150">
+            <a:solidFill>
+              <a:srgbClr val="C00000"/>
+            </a:solidFill>
+          </a:ln>
+        </p:spPr>
+        <p:style>
+          <a:lnRef idx="2">
+            <a:schemeClr val="accent1">
+              <a:shade val="50000"/>
+            </a:schemeClr>
+          </a:lnRef>
+          <a:fillRef idx="1">
+            <a:schemeClr val="accent1"/>
+          </a:fillRef>
+          <a:effectRef idx="0">
+            <a:schemeClr val="accent1"/>
+          </a:effectRef>
+          <a:fontRef idx="minor">
+            <a:schemeClr val="lt1"/>
+          </a:fontRef>
+        </p:style>
+        <p:txBody>
+          <a:bodyPr rtlCol="0" anchor="ctr"/>
+          <a:lstStyle/>
+          <a:p>
+            <a:pPr algn="ctr"/>
+            <a:endParaRPr lang="en-GB" dirty="0"/>
+          </a:p>
+        </p:txBody>
+      </p:sp>
+    </p:spTree>
+    <p:extLst>
+      <p:ext uri="{BB962C8B-B14F-4D97-AF65-F5344CB8AC3E}">
+        <p14:creationId xmlns:p14="http://schemas.microsoft.com/office/powerpoint/2010/main" val="2583721842"/>
+      </p:ext>
+    </p:extLst>
+  </p:cSld>
+  <p:clrMapOvr>
+    <a:masterClrMapping/>
+  </p:clrMapOvr>
+</p:sld>
+</file>
+
+<file path=ppt/slides/slide15.xml><?xml version="1.0" encoding="utf-8"?>
+<p:sld xmlns:a="http://schemas.openxmlformats.org/drawingml/2006/main" xmlns:r="http://schemas.openxmlformats.org/officeDocument/2006/relationships" xmlns:p="http://schemas.openxmlformats.org/presentationml/2006/main">
+  <p:cSld>
+    <p:spTree>
+      <p:nvGrpSpPr>
+        <p:cNvPr id="1" name=""/>
+        <p:cNvGrpSpPr/>
+        <p:nvPr/>
+      </p:nvGrpSpPr>
+      <p:grpSpPr>
+        <a:xfrm>
+          <a:off x="0" y="0"/>
+          <a:ext cx="0" cy="0"/>
+          <a:chOff x="0" y="0"/>
+          <a:chExt cx="0" cy="0"/>
+        </a:xfrm>
+      </p:grpSpPr>
+      <p:pic>
+        <p:nvPicPr>
+          <p:cNvPr id="3" name="Picture 2">
+            <a:extLst>
+              <a:ext uri="{FF2B5EF4-FFF2-40B4-BE49-F238E27FC236}">
+                <a16:creationId xmlns:a16="http://schemas.microsoft.com/office/drawing/2014/main" id="{86B045F3-4559-4022-9D3E-502512AFFF56}"/>
+              </a:ext>
+            </a:extLst>
+          </p:cNvPr>
+          <p:cNvPicPr>
+            <a:picLocks noChangeAspect="1"/>
+          </p:cNvPicPr>
+          <p:nvPr/>
+        </p:nvPicPr>
+        <p:blipFill>
+          <a:blip r:embed="rId2"/>
+          <a:stretch>
+            <a:fillRect/>
+          </a:stretch>
+        </p:blipFill>
+        <p:spPr>
+          <a:xfrm>
+            <a:off x="1953960" y="0"/>
+            <a:ext cx="8284079" cy="6858000"/>
+          </a:xfrm>
+          <a:prstGeom prst="rect">
+            <a:avLst/>
+          </a:prstGeom>
+        </p:spPr>
+      </p:pic>
+      <p:sp>
+        <p:nvSpPr>
+          <p:cNvPr id="6" name="Rectangle: Rounded Corners 5">
+            <a:extLst>
+              <a:ext uri="{FF2B5EF4-FFF2-40B4-BE49-F238E27FC236}">
+                <a16:creationId xmlns:a16="http://schemas.microsoft.com/office/drawing/2014/main" id="{DCD297E9-962C-4C6F-A128-4DAD3128C7C7}"/>
+              </a:ext>
+            </a:extLst>
+          </p:cNvPr>
+          <p:cNvSpPr/>
+          <p:nvPr/>
+        </p:nvSpPr>
+        <p:spPr>
+          <a:xfrm>
+            <a:off x="6531985" y="1467084"/>
+            <a:ext cx="2990706" cy="334006"/>
+          </a:xfrm>
+          <a:prstGeom prst="roundRect">
+            <a:avLst/>
+          </a:prstGeom>
+          <a:noFill/>
+          <a:ln w="57150">
+            <a:solidFill>
+              <a:srgbClr val="C00000"/>
+            </a:solidFill>
+          </a:ln>
+        </p:spPr>
+        <p:style>
+          <a:lnRef idx="2">
+            <a:schemeClr val="accent1">
+              <a:shade val="50000"/>
+            </a:schemeClr>
+          </a:lnRef>
+          <a:fillRef idx="1">
+            <a:schemeClr val="accent1"/>
+          </a:fillRef>
+          <a:effectRef idx="0">
+            <a:schemeClr val="accent1"/>
+          </a:effectRef>
+          <a:fontRef idx="minor">
+            <a:schemeClr val="lt1"/>
+          </a:fontRef>
+        </p:style>
+        <p:txBody>
+          <a:bodyPr rtlCol="0" anchor="ctr"/>
+          <a:lstStyle/>
+          <a:p>
+            <a:pPr algn="ctr"/>
+            <a:endParaRPr lang="en-GB" dirty="0"/>
+          </a:p>
+        </p:txBody>
+      </p:sp>
+    </p:spTree>
+    <p:extLst>
+      <p:ext uri="{BB962C8B-B14F-4D97-AF65-F5344CB8AC3E}">
+        <p14:creationId xmlns:p14="http://schemas.microsoft.com/office/powerpoint/2010/main" val="809036595"/>
+      </p:ext>
+    </p:extLst>
+  </p:cSld>
+  <p:clrMapOvr>
+    <a:masterClrMapping/>
+  </p:clrMapOvr>
+</p:sld>
+</file>
+
+<file path=ppt/slides/slide16.xml><?xml version="1.0" encoding="utf-8"?>
+<p:sld xmlns:a="http://schemas.openxmlformats.org/drawingml/2006/main" xmlns:r="http://schemas.openxmlformats.org/officeDocument/2006/relationships" xmlns:p="http://schemas.openxmlformats.org/presentationml/2006/main">
+  <p:cSld>
+    <p:spTree>
+      <p:nvGrpSpPr>
+        <p:cNvPr id="1" name=""/>
+        <p:cNvGrpSpPr/>
+        <p:nvPr/>
+      </p:nvGrpSpPr>
+      <p:grpSpPr>
+        <a:xfrm>
+          <a:off x="0" y="0"/>
+          <a:ext cx="0" cy="0"/>
+          <a:chOff x="0" y="0"/>
+          <a:chExt cx="0" cy="0"/>
+        </a:xfrm>
+      </p:grpSpPr>
+      <p:pic>
+        <p:nvPicPr>
+          <p:cNvPr id="2" name="Picture 1">
+            <a:extLst>
+              <a:ext uri="{FF2B5EF4-FFF2-40B4-BE49-F238E27FC236}">
+                <a16:creationId xmlns:a16="http://schemas.microsoft.com/office/drawing/2014/main" id="{728417FE-F505-481E-85DD-68E2C6AB8040}"/>
+              </a:ext>
+            </a:extLst>
+          </p:cNvPr>
+          <p:cNvPicPr>
+            <a:picLocks noChangeAspect="1"/>
+          </p:cNvPicPr>
+          <p:nvPr/>
+        </p:nvPicPr>
+        <p:blipFill>
+          <a:blip r:embed="rId2"/>
+          <a:stretch>
+            <a:fillRect/>
+          </a:stretch>
+        </p:blipFill>
+        <p:spPr>
+          <a:xfrm>
+            <a:off x="0" y="130175"/>
+            <a:ext cx="12192000" cy="6597650"/>
+          </a:xfrm>
+          <a:prstGeom prst="rect">
+            <a:avLst/>
+          </a:prstGeom>
+        </p:spPr>
+      </p:pic>
+      <p:sp>
+        <p:nvSpPr>
+          <p:cNvPr id="3" name="Rectangle: Rounded Corners 2">
+            <a:extLst>
+              <a:ext uri="{FF2B5EF4-FFF2-40B4-BE49-F238E27FC236}">
+                <a16:creationId xmlns:a16="http://schemas.microsoft.com/office/drawing/2014/main" id="{2D915223-DAE2-4640-BA56-2A0345614CDB}"/>
+              </a:ext>
+            </a:extLst>
+          </p:cNvPr>
+          <p:cNvSpPr/>
+          <p:nvPr/>
+        </p:nvSpPr>
+        <p:spPr>
+          <a:xfrm>
+            <a:off x="1754908" y="6243782"/>
+            <a:ext cx="1099128" cy="295563"/>
+          </a:xfrm>
+          <a:prstGeom prst="roundRect">
+            <a:avLst/>
+          </a:prstGeom>
+          <a:noFill/>
+          <a:ln w="57150">
+            <a:solidFill>
+              <a:srgbClr val="C00000"/>
+            </a:solidFill>
+          </a:ln>
+        </p:spPr>
+        <p:style>
+          <a:lnRef idx="2">
+            <a:schemeClr val="accent1">
+              <a:shade val="50000"/>
+            </a:schemeClr>
+          </a:lnRef>
+          <a:fillRef idx="1">
+            <a:schemeClr val="accent1"/>
+          </a:fillRef>
+          <a:effectRef idx="0">
+            <a:schemeClr val="accent1"/>
+          </a:effectRef>
+          <a:fontRef idx="minor">
+            <a:schemeClr val="lt1"/>
+          </a:fontRef>
+        </p:style>
+        <p:txBody>
+          <a:bodyPr rtlCol="0" anchor="ctr"/>
+          <a:lstStyle/>
+          <a:p>
+            <a:pPr algn="ctr"/>
+            <a:endParaRPr lang="en-GB" dirty="0"/>
+          </a:p>
+        </p:txBody>
+      </p:sp>
+      <p:sp>
+        <p:nvSpPr>
+          <p:cNvPr id="4" name="Rectangle: Rounded Corners 3">
+            <a:extLst>
+              <a:ext uri="{FF2B5EF4-FFF2-40B4-BE49-F238E27FC236}">
+                <a16:creationId xmlns:a16="http://schemas.microsoft.com/office/drawing/2014/main" id="{10F76350-A555-4B21-9787-D66AB92BE0B7}"/>
+              </a:ext>
+            </a:extLst>
+          </p:cNvPr>
+          <p:cNvSpPr/>
+          <p:nvPr/>
+        </p:nvSpPr>
+        <p:spPr>
+          <a:xfrm>
+            <a:off x="10049164" y="2826327"/>
+            <a:ext cx="1856509" cy="387928"/>
+          </a:xfrm>
+          <a:prstGeom prst="roundRect">
+            <a:avLst/>
+          </a:prstGeom>
+          <a:noFill/>
+          <a:ln w="57150">
+            <a:solidFill>
+              <a:srgbClr val="C00000"/>
+            </a:solidFill>
+          </a:ln>
+        </p:spPr>
+        <p:style>
+          <a:lnRef idx="2">
+            <a:schemeClr val="accent1">
+              <a:shade val="50000"/>
+            </a:schemeClr>
+          </a:lnRef>
+          <a:fillRef idx="1">
+            <a:schemeClr val="accent1"/>
+          </a:fillRef>
+          <a:effectRef idx="0">
+            <a:schemeClr val="accent1"/>
+          </a:effectRef>
+          <a:fontRef idx="minor">
+            <a:schemeClr val="lt1"/>
+          </a:fontRef>
+        </p:style>
+        <p:txBody>
+          <a:bodyPr rtlCol="0" anchor="ctr"/>
+          <a:lstStyle/>
+          <a:p>
+            <a:pPr algn="ctr"/>
+            <a:endParaRPr lang="en-GB" dirty="0"/>
+          </a:p>
+        </p:txBody>
+      </p:sp>
+      <p:pic>
+        <p:nvPicPr>
+          <p:cNvPr id="5" name="Picture 4">
+            <a:extLst>
+              <a:ext uri="{FF2B5EF4-FFF2-40B4-BE49-F238E27FC236}">
+                <a16:creationId xmlns:a16="http://schemas.microsoft.com/office/drawing/2014/main" id="{BF014134-CCEE-4214-8652-EAF599974509}"/>
+              </a:ext>
+            </a:extLst>
+          </p:cNvPr>
+          <p:cNvPicPr>
+            <a:picLocks noChangeAspect="1"/>
+          </p:cNvPicPr>
+          <p:nvPr/>
+        </p:nvPicPr>
+        <p:blipFill>
+          <a:blip r:embed="rId3"/>
+          <a:stretch>
+            <a:fillRect/>
+          </a:stretch>
+        </p:blipFill>
+        <p:spPr>
+          <a:xfrm>
+            <a:off x="152400" y="280416"/>
+            <a:ext cx="12192000" cy="6601968"/>
+          </a:xfrm>
+          <a:prstGeom prst="rect">
+            <a:avLst/>
+          </a:prstGeom>
+        </p:spPr>
+      </p:pic>
+    </p:spTree>
+    <p:extLst>
+      <p:ext uri="{BB962C8B-B14F-4D97-AF65-F5344CB8AC3E}">
+        <p14:creationId xmlns:p14="http://schemas.microsoft.com/office/powerpoint/2010/main" val="3721958795"/>
+      </p:ext>
+    </p:extLst>
+  </p:cSld>
+  <p:clrMapOvr>
+    <a:masterClrMapping/>
+  </p:clrMapOvr>
+</p:sld>
+</file>
+
+<file path=ppt/slides/slide17.xml><?xml version="1.0" encoding="utf-8"?>
+<p:sld xmlns:a="http://schemas.openxmlformats.org/drawingml/2006/main" xmlns:r="http://schemas.openxmlformats.org/officeDocument/2006/relationships" xmlns:p="http://schemas.openxmlformats.org/presentationml/2006/main">
+  <p:cSld>
+    <p:spTree>
+      <p:nvGrpSpPr>
+        <p:cNvPr id="1" name=""/>
+        <p:cNvGrpSpPr/>
+        <p:nvPr/>
+      </p:nvGrpSpPr>
+      <p:grpSpPr>
+        <a:xfrm>
+          <a:off x="0" y="0"/>
+          <a:ext cx="0" cy="0"/>
+          <a:chOff x="0" y="0"/>
+          <a:chExt cx="0" cy="0"/>
+        </a:xfrm>
+      </p:grpSpPr>
+      <p:pic>
+        <p:nvPicPr>
+          <p:cNvPr id="2" name="Picture 1">
+            <a:extLst>
+              <a:ext uri="{FF2B5EF4-FFF2-40B4-BE49-F238E27FC236}">
+                <a16:creationId xmlns:a16="http://schemas.microsoft.com/office/drawing/2014/main" id="{82420648-6955-48A7-8C6C-C6BD3867F394}"/>
+              </a:ext>
+            </a:extLst>
+          </p:cNvPr>
+          <p:cNvPicPr>
+            <a:picLocks noChangeAspect="1"/>
+          </p:cNvPicPr>
+          <p:nvPr/>
+        </p:nvPicPr>
+        <p:blipFill>
+          <a:blip r:embed="rId2"/>
+          <a:stretch>
+            <a:fillRect/>
+          </a:stretch>
+        </p:blipFill>
+        <p:spPr>
+          <a:xfrm>
+            <a:off x="1953960" y="0"/>
+            <a:ext cx="8284079" cy="6858000"/>
+          </a:xfrm>
+          <a:prstGeom prst="rect">
+            <a:avLst/>
+          </a:prstGeom>
+        </p:spPr>
+      </p:pic>
+      <p:sp>
+        <p:nvSpPr>
+          <p:cNvPr id="3" name="Rectangle: Rounded Corners 2">
+            <a:extLst>
+              <a:ext uri="{FF2B5EF4-FFF2-40B4-BE49-F238E27FC236}">
+                <a16:creationId xmlns:a16="http://schemas.microsoft.com/office/drawing/2014/main" id="{3866B6EC-0982-4246-86C9-46C52223EDCB}"/>
+              </a:ext>
+            </a:extLst>
+          </p:cNvPr>
+          <p:cNvSpPr/>
+          <p:nvPr/>
+        </p:nvSpPr>
+        <p:spPr>
+          <a:xfrm>
+            <a:off x="6531985" y="1467084"/>
+            <a:ext cx="2990706" cy="334006"/>
+          </a:xfrm>
+          <a:prstGeom prst="roundRect">
+            <a:avLst/>
+          </a:prstGeom>
+          <a:noFill/>
+          <a:ln w="57150">
+            <a:solidFill>
+              <a:srgbClr val="C00000"/>
+            </a:solidFill>
+          </a:ln>
+        </p:spPr>
+        <p:style>
+          <a:lnRef idx="2">
+            <a:schemeClr val="accent1">
+              <a:shade val="50000"/>
+            </a:schemeClr>
+          </a:lnRef>
+          <a:fillRef idx="1">
+            <a:schemeClr val="accent1"/>
+          </a:fillRef>
+          <a:effectRef idx="0">
+            <a:schemeClr val="accent1"/>
+          </a:effectRef>
+          <a:fontRef idx="minor">
+            <a:schemeClr val="lt1"/>
+          </a:fontRef>
+        </p:style>
+        <p:txBody>
+          <a:bodyPr rtlCol="0" anchor="ctr"/>
+          <a:lstStyle/>
+          <a:p>
+            <a:pPr algn="ctr"/>
+            <a:endParaRPr lang="en-GB" dirty="0"/>
+          </a:p>
+        </p:txBody>
+      </p:sp>
+    </p:spTree>
+    <p:extLst>
+      <p:ext uri="{BB962C8B-B14F-4D97-AF65-F5344CB8AC3E}">
+        <p14:creationId xmlns:p14="http://schemas.microsoft.com/office/powerpoint/2010/main" val="3444035722"/>
+      </p:ext>
+    </p:extLst>
+  </p:cSld>
+  <p:clrMapOvr>
+    <a:masterClrMapping/>
+  </p:clrMapOvr>
+</p:sld>
+</file>
+
+<file path=ppt/slides/slide18.xml><?xml version="1.0" encoding="utf-8"?>
+<p:sld xmlns:a="http://schemas.openxmlformats.org/drawingml/2006/main" xmlns:r="http://schemas.openxmlformats.org/officeDocument/2006/relationships" xmlns:p="http://schemas.openxmlformats.org/presentationml/2006/main">
+  <p:cSld>
+    <p:spTree>
+      <p:nvGrpSpPr>
+        <p:cNvPr id="1" name=""/>
+        <p:cNvGrpSpPr/>
+        <p:nvPr/>
+      </p:nvGrpSpPr>
+      <p:grpSpPr>
+        <a:xfrm>
+          <a:off x="0" y="0"/>
+          <a:ext cx="0" cy="0"/>
+          <a:chOff x="0" y="0"/>
+          <a:chExt cx="0" cy="0"/>
+        </a:xfrm>
+      </p:grpSpPr>
+      <p:pic>
+        <p:nvPicPr>
+          <p:cNvPr id="2" name="Picture 1">
+            <a:extLst>
+              <a:ext uri="{FF2B5EF4-FFF2-40B4-BE49-F238E27FC236}">
+                <a16:creationId xmlns:a16="http://schemas.microsoft.com/office/drawing/2014/main" id="{891097F6-66DC-4076-8B0C-78ABA015EBC7}"/>
+              </a:ext>
+            </a:extLst>
+          </p:cNvPr>
+          <p:cNvPicPr>
+            <a:picLocks noChangeAspect="1"/>
+          </p:cNvPicPr>
+          <p:nvPr/>
+        </p:nvPicPr>
+        <p:blipFill>
+          <a:blip r:embed="rId2">
+            <a:extLst>
+              <a:ext uri="{28A0092B-C50C-407E-A947-70E740481C1C}">
+                <a14:useLocalDpi xmlns:a14="http://schemas.microsoft.com/office/drawing/2010/main" val="0"/>
+              </a:ext>
+            </a:extLst>
+          </a:blip>
+          <a:stretch>
+            <a:fillRect/>
+          </a:stretch>
+        </p:blipFill>
+        <p:spPr>
+          <a:xfrm>
+            <a:off x="2390775" y="76200"/>
+            <a:ext cx="7410450" cy="6705599"/>
+          </a:xfrm>
+          <a:prstGeom prst="rect">
+            <a:avLst/>
+          </a:prstGeom>
+        </p:spPr>
+      </p:pic>
+      <p:sp>
+        <p:nvSpPr>
+          <p:cNvPr id="3" name="Rectangle: Rounded Corners 2">
+            <a:extLst>
+              <a:ext uri="{FF2B5EF4-FFF2-40B4-BE49-F238E27FC236}">
+                <a16:creationId xmlns:a16="http://schemas.microsoft.com/office/drawing/2014/main" id="{90FC197C-7CBC-4511-B7D0-11D3A665503E}"/>
+              </a:ext>
+            </a:extLst>
+          </p:cNvPr>
+          <p:cNvSpPr/>
+          <p:nvPr/>
+        </p:nvSpPr>
+        <p:spPr>
+          <a:xfrm>
+            <a:off x="4598845" y="708766"/>
+            <a:ext cx="434974" cy="362653"/>
+          </a:xfrm>
+          <a:prstGeom prst="roundRect">
+            <a:avLst/>
+          </a:prstGeom>
+          <a:noFill/>
+          <a:ln w="57150">
+            <a:solidFill>
+              <a:srgbClr val="C00000"/>
+            </a:solidFill>
+          </a:ln>
+        </p:spPr>
+        <p:style>
+          <a:lnRef idx="2">
+            <a:schemeClr val="accent1">
+              <a:shade val="50000"/>
+            </a:schemeClr>
+          </a:lnRef>
+          <a:fillRef idx="1">
+            <a:schemeClr val="accent1"/>
+          </a:fillRef>
+          <a:effectRef idx="0">
+            <a:schemeClr val="accent1"/>
+          </a:effectRef>
+          <a:fontRef idx="minor">
+            <a:schemeClr val="lt1"/>
+          </a:fontRef>
+        </p:style>
+        <p:txBody>
+          <a:bodyPr rtlCol="0" anchor="ctr"/>
+          <a:lstStyle/>
+          <a:p>
+            <a:pPr algn="ctr"/>
+            <a:endParaRPr lang="en-GB" dirty="0"/>
+          </a:p>
+        </p:txBody>
+      </p:sp>
+      <p:sp>
+        <p:nvSpPr>
+          <p:cNvPr id="4" name="TextBox 3">
+            <a:extLst>
+              <a:ext uri="{FF2B5EF4-FFF2-40B4-BE49-F238E27FC236}">
+                <a16:creationId xmlns:a16="http://schemas.microsoft.com/office/drawing/2014/main" id="{A013D0D8-78BB-4F51-9CBF-3D71008F8AAA}"/>
+              </a:ext>
+            </a:extLst>
+          </p:cNvPr>
+          <p:cNvSpPr txBox="1"/>
+          <p:nvPr/>
+        </p:nvSpPr>
+        <p:spPr>
+          <a:xfrm>
+            <a:off x="4598845" y="1473076"/>
+            <a:ext cx="2469631" cy="1057588"/>
+          </a:xfrm>
+          <a:prstGeom prst="rect">
+            <a:avLst/>
+          </a:prstGeom>
+          <a:solidFill>
+            <a:schemeClr val="tx1">
+              <a:alpha val="77000"/>
+            </a:schemeClr>
+          </a:solidFill>
+        </p:spPr>
+        <p:txBody>
+          <a:bodyPr wrap="square" lIns="36000" tIns="36000" rIns="36000" bIns="36000" rtlCol="0">
+            <a:spAutoFit/>
+          </a:bodyPr>
+          <a:lstStyle/>
+          <a:p>
+            <a:r>
+              <a:rPr lang="en-GB" dirty="0">
+                <a:solidFill>
+                  <a:schemeClr val="bg1"/>
+                </a:solidFill>
+              </a:rPr>
+              <a:t>You should see a list of the imported tables here</a:t>
+            </a:r>
+            <a:br>
+              <a:rPr lang="en-GB" dirty="0">
+                <a:solidFill>
+                  <a:schemeClr val="bg1"/>
+                </a:solidFill>
+              </a:rPr>
+            </a:br>
+            <a:r>
+              <a:rPr lang="en-GB" sz="1400" dirty="0">
+                <a:solidFill>
+                  <a:schemeClr val="accent4">
+                    <a:lumMod val="20000"/>
+                    <a:lumOff val="80000"/>
+                  </a:schemeClr>
+                </a:solidFill>
+              </a:rPr>
+              <a:t>If they do not show you might need to press the refresh button</a:t>
+            </a:r>
+            <a:endParaRPr lang="en-GB" dirty="0">
+              <a:solidFill>
+                <a:schemeClr val="accent4">
+                  <a:lumMod val="20000"/>
+                  <a:lumOff val="80000"/>
+                </a:schemeClr>
+              </a:solidFill>
+            </a:endParaRPr>
+          </a:p>
+        </p:txBody>
+      </p:sp>
+      <p:cxnSp>
+        <p:nvCxnSpPr>
+          <p:cNvPr id="7" name="Straight Arrow Connector 6">
+            <a:extLst>
+              <a:ext uri="{FF2B5EF4-FFF2-40B4-BE49-F238E27FC236}">
+                <a16:creationId xmlns:a16="http://schemas.microsoft.com/office/drawing/2014/main" id="{B06F3AAA-6E6E-435C-BBBE-1FCFB19D513A}"/>
+              </a:ext>
+            </a:extLst>
+          </p:cNvPr>
+          <p:cNvCxnSpPr>
+            <a:cxnSpLocks/>
+          </p:cNvCxnSpPr>
+          <p:nvPr/>
+        </p:nvCxnSpPr>
+        <p:spPr>
+          <a:xfrm flipH="1">
+            <a:off x="4071715" y="2084997"/>
+            <a:ext cx="426394" cy="200779"/>
+          </a:xfrm>
+          <a:prstGeom prst="straightConnector1">
+            <a:avLst/>
+          </a:prstGeom>
+          <a:ln w="38100">
+            <a:solidFill>
+              <a:srgbClr val="C00000"/>
+            </a:solidFill>
+            <a:tailEnd type="triangle"/>
+          </a:ln>
+        </p:spPr>
+        <p:style>
+          <a:lnRef idx="1">
+            <a:schemeClr val="accent1"/>
+          </a:lnRef>
+          <a:fillRef idx="0">
+            <a:schemeClr val="accent1"/>
+          </a:fillRef>
+          <a:effectRef idx="0">
+            <a:schemeClr val="accent1"/>
+          </a:effectRef>
+          <a:fontRef idx="minor">
+            <a:schemeClr val="tx1"/>
+          </a:fontRef>
+        </p:style>
+      </p:cxnSp>
+    </p:spTree>
+    <p:extLst>
+      <p:ext uri="{BB962C8B-B14F-4D97-AF65-F5344CB8AC3E}">
+        <p14:creationId xmlns:p14="http://schemas.microsoft.com/office/powerpoint/2010/main" val="3133138670"/>
       </p:ext>
     </p:extLst>
   </p:cSld>

</xml_diff>